<commit_message>
Analytical Methods Slide => Added Content
</commit_message>
<xml_diff>
--- a/Final Submission/PPT Slides/Analytical Methods Slide.pptx
+++ b/Final Submission/PPT Slides/Analytical Methods Slide.pptx
@@ -104,6 +104,11 @@
       </a:defRPr>
     </a:lvl9pPr>
   </p:defaultTextStyle>
+  <p:extLst>
+    <p:ext uri="{EFAFB233-063F-42B5-8137-9DF3F51BA10A}">
+      <p15:sldGuideLst xmlns:p15="http://schemas.microsoft.com/office/powerpoint/2012/main"/>
+    </p:ext>
+  </p:extLst>
 </p:presentation>
 </file>
 
@@ -152,14 +157,14 @@
           </a:ln>
           <a:extLst>
             <a:ext uri="{909E8E84-426E-40dd-AFC4-6F175D3DCCD1}">
-              <a14:hiddenFill xmlns="" xmlns:a14="http://schemas.microsoft.com/office/drawing/2010/main">
+              <a14:hiddenFill xmlns:a14="http://schemas.microsoft.com/office/drawing/2010/main" xmlns="">
                 <a:solidFill>
                   <a:srgbClr val="FFFFFF"/>
                 </a:solidFill>
               </a14:hiddenFill>
             </a:ext>
             <a:ext uri="{91240B29-F687-4f45-9708-019B960494DF}">
-              <a14:hiddenLine xmlns="" xmlns:a14="http://schemas.microsoft.com/office/drawing/2010/main" w="9525">
+              <a14:hiddenLine xmlns:a14="http://schemas.microsoft.com/office/drawing/2010/main" xmlns="" w="9525">
                 <a:solidFill>
                   <a:srgbClr val="000000"/>
                 </a:solidFill>
@@ -377,14 +382,14 @@
           </a:ln>
           <a:extLst>
             <a:ext uri="{909E8E84-426E-40dd-AFC4-6F175D3DCCD1}">
-              <a14:hiddenFill xmlns="" xmlns:a14="http://schemas.microsoft.com/office/drawing/2010/main">
+              <a14:hiddenFill xmlns:a14="http://schemas.microsoft.com/office/drawing/2010/main" xmlns="">
                 <a:solidFill>
                   <a:srgbClr val="FFFFFF"/>
                 </a:solidFill>
               </a14:hiddenFill>
             </a:ext>
             <a:ext uri="{91240B29-F687-4f45-9708-019B960494DF}">
-              <a14:hiddenLine xmlns="" xmlns:a14="http://schemas.microsoft.com/office/drawing/2010/main" w="9525">
+              <a14:hiddenLine xmlns:a14="http://schemas.microsoft.com/office/drawing/2010/main" xmlns="" w="9525">
                 <a:solidFill>
                   <a:srgbClr val="000000"/>
                 </a:solidFill>
@@ -548,7 +553,7 @@
             <a:fld id="{1210D201-B81E-470F-A152-87DB35E113A8}" type="datetimeFigureOut">
               <a:rPr lang="en-US" altLang="en-US"/>
               <a:pPr/>
-              <a:t>3/29/2022</a:t>
+              <a:t>3/29/22</a:t>
             </a:fld>
             <a:endParaRPr lang="en-US" altLang="en-US"/>
           </a:p>
@@ -912,7 +917,7 @@
             <a:fld id="{065B2143-4885-47E3-A9EB-607A302E185E}" type="datetimeFigureOut">
               <a:rPr lang="en-US" altLang="en-US"/>
               <a:pPr/>
-              <a:t>3/29/2022</a:t>
+              <a:t>3/29/22</a:t>
             </a:fld>
             <a:endParaRPr lang="en-US" altLang="en-US"/>
           </a:p>
@@ -1195,7 +1200,7 @@
             <a:fld id="{FE7ACBF5-1757-4FA1-8770-7D42E8AB3403}" type="datetimeFigureOut">
               <a:rPr lang="en-US" altLang="en-US"/>
               <a:pPr/>
-              <a:t>3/29/2022</a:t>
+              <a:t>3/29/22</a:t>
             </a:fld>
             <a:endParaRPr lang="en-US" altLang="en-US"/>
           </a:p>
@@ -1526,7 +1531,7 @@
             <a:fld id="{31EC4CDC-1D50-43D9-92DD-EC1F6918FC5E}" type="datetimeFigureOut">
               <a:rPr lang="en-US" altLang="en-US"/>
               <a:pPr/>
-              <a:t>3/29/2022</a:t>
+              <a:t>3/29/22</a:t>
             </a:fld>
             <a:endParaRPr lang="en-US" altLang="en-US"/>
           </a:p>
@@ -1988,7 +1993,7 @@
             <a:fld id="{B29945B5-1676-4A4A-9769-87262D092169}" type="datetimeFigureOut">
               <a:rPr lang="en-US" altLang="en-US"/>
               <a:pPr/>
-              <a:t>3/29/2022</a:t>
+              <a:t>3/29/22</a:t>
             </a:fld>
             <a:endParaRPr lang="en-US" altLang="en-US"/>
           </a:p>
@@ -2154,7 +2159,7 @@
             <a:fld id="{15EA8BE1-029F-4049-94C0-3048ABCECBF1}" type="datetimeFigureOut">
               <a:rPr lang="en-US" altLang="en-US"/>
               <a:pPr/>
-              <a:t>3/29/2022</a:t>
+              <a:t>3/29/22</a:t>
             </a:fld>
             <a:endParaRPr lang="en-US" altLang="en-US"/>
           </a:p>
@@ -2284,7 +2289,7 @@
             <a:fld id="{AE94213C-83F6-4CB9-84A6-5E06AF59783F}" type="datetimeFigureOut">
               <a:rPr lang="en-US" altLang="en-US"/>
               <a:pPr/>
-              <a:t>3/29/2022</a:t>
+              <a:t>3/29/22</a:t>
             </a:fld>
             <a:endParaRPr lang="en-US" altLang="en-US"/>
           </a:p>
@@ -2597,7 +2602,7 @@
             <a:fld id="{923DF63F-B3A0-44E6-BDF4-2B9B8EC924BB}" type="datetimeFigureOut">
               <a:rPr lang="en-US" altLang="en-US"/>
               <a:pPr/>
-              <a:t>3/29/2022</a:t>
+              <a:t>3/29/22</a:t>
             </a:fld>
             <a:endParaRPr lang="en-US" altLang="en-US"/>
           </a:p>
@@ -2893,7 +2898,7 @@
             <a:fld id="{B151E1F3-2510-46B4-B4CA-F46EB747AB32}" type="datetimeFigureOut">
               <a:rPr lang="en-US" altLang="en-US"/>
               <a:pPr/>
-              <a:t>3/29/2022</a:t>
+              <a:t>3/29/22</a:t>
             </a:fld>
             <a:endParaRPr lang="en-US" altLang="en-US"/>
           </a:p>
@@ -3140,7 +3145,7 @@
             <a:fld id="{C11C1CF1-2F3A-4423-90F7-0EB150F19318}" type="datetimeFigureOut">
               <a:rPr lang="en-US" altLang="en-US"/>
               <a:pPr/>
-              <a:t>3/29/2022</a:t>
+              <a:t>3/29/22</a:t>
             </a:fld>
             <a:endParaRPr lang="en-US" altLang="en-US"/>
           </a:p>
@@ -5273,7 +5278,7 @@
                 </a:buClr>
               </a:pPr>
               <a:r>
-                <a:rPr lang="en" sz="1200" kern="0">
+                <a:rPr lang="en" sz="1200" kern="0" dirty="0">
                   <a:solidFill>
                     <a:srgbClr val="434343"/>
                   </a:solidFill>
@@ -5282,9 +5287,9 @@
                   <a:cs typeface="Roboto"/>
                   <a:sym typeface="Roboto"/>
                 </a:rPr>
-                <a:t>Mercury is the closest planet to the Sun and the smallest one</a:t>
+                <a:t>Study the strength of relationships between variables</a:t>
               </a:r>
-              <a:endParaRPr sz="1200" kern="0">
+              <a:endParaRPr sz="1200" kern="0" dirty="0">
                 <a:solidFill>
                   <a:srgbClr val="434343"/>
                 </a:solidFill>
@@ -5377,9 +5382,9 @@
         <p:grpSpPr>
           <a:xfrm>
             <a:off x="7239000" y="3138616"/>
-            <a:ext cx="2328600" cy="784362"/>
+            <a:ext cx="2601036" cy="784362"/>
             <a:chOff x="5500850" y="1655600"/>
-            <a:chExt cx="2328600" cy="784362"/>
+            <a:chExt cx="2601036" cy="784362"/>
           </a:xfrm>
         </p:grpSpPr>
         <p:sp>
@@ -5397,7 +5402,7 @@
           <p:spPr>
             <a:xfrm>
               <a:off x="5500850" y="1907162"/>
-              <a:ext cx="2328600" cy="532800"/>
+              <a:ext cx="2601036" cy="532800"/>
             </a:xfrm>
             <a:prstGeom prst="rect">
               <a:avLst/>
@@ -5419,7 +5424,7 @@
                 </a:buClr>
               </a:pPr>
               <a:r>
-                <a:rPr lang="en" sz="1200" kern="0">
+                <a:rPr lang="en" sz="1200" kern="0" dirty="0">
                   <a:solidFill>
                     <a:srgbClr val="434343"/>
                   </a:solidFill>
@@ -5428,9 +5433,9 @@
                   <a:cs typeface="Roboto"/>
                   <a:sym typeface="Roboto"/>
                 </a:rPr>
-                <a:t>Despite being red, Mars is actually a cold place</a:t>
+                <a:t>Selection of statistically significant features for predictive modeling</a:t>
               </a:r>
-              <a:endParaRPr sz="1200" kern="0">
+              <a:endParaRPr sz="1200" kern="0" dirty="0">
                 <a:solidFill>
                   <a:srgbClr val="434343"/>
                 </a:solidFill>
@@ -5522,9 +5527,9 @@
         <p:grpSpPr>
           <a:xfrm>
             <a:off x="7239000" y="4122008"/>
-            <a:ext cx="2328600" cy="784362"/>
+            <a:ext cx="2464558" cy="784362"/>
             <a:chOff x="5500850" y="2564550"/>
-            <a:chExt cx="2328600" cy="784362"/>
+            <a:chExt cx="2464558" cy="784362"/>
           </a:xfrm>
         </p:grpSpPr>
         <p:sp>
@@ -5542,7 +5547,7 @@
           <p:spPr>
             <a:xfrm>
               <a:off x="5500850" y="2816112"/>
-              <a:ext cx="2328600" cy="532800"/>
+              <a:ext cx="2464558" cy="532800"/>
             </a:xfrm>
             <a:prstGeom prst="rect">
               <a:avLst/>
@@ -5564,7 +5569,7 @@
                 </a:buClr>
               </a:pPr>
               <a:r>
-                <a:rPr lang="en" sz="1200" kern="0">
+                <a:rPr lang="en" sz="1200" kern="0" dirty="0">
                   <a:solidFill>
                     <a:srgbClr val="434343"/>
                   </a:solidFill>
@@ -5573,9 +5578,9 @@
                   <a:cs typeface="Roboto"/>
                   <a:sym typeface="Roboto"/>
                 </a:rPr>
-                <a:t>Earth, where we live on, is the third planet from the Sun</a:t>
+                <a:t>Reduces model complexity and prevents over-fitting of the model</a:t>
               </a:r>
-              <a:endParaRPr sz="1200" kern="0">
+              <a:endParaRPr sz="1200" kern="0" dirty="0">
                 <a:solidFill>
                   <a:srgbClr val="434343"/>
                 </a:solidFill>
@@ -5667,9 +5672,9 @@
         <p:grpSpPr>
           <a:xfrm>
             <a:off x="7239000" y="5105400"/>
-            <a:ext cx="2328600" cy="784362"/>
+            <a:ext cx="2464558" cy="784362"/>
             <a:chOff x="5500850" y="3501425"/>
-            <a:chExt cx="2328600" cy="784362"/>
+            <a:chExt cx="2464558" cy="784362"/>
           </a:xfrm>
         </p:grpSpPr>
         <p:sp>
@@ -5687,7 +5692,7 @@
           <p:spPr>
             <a:xfrm>
               <a:off x="5500850" y="3752987"/>
-              <a:ext cx="2328600" cy="532800"/>
+              <a:ext cx="2464558" cy="532800"/>
             </a:xfrm>
             <a:prstGeom prst="rect">
               <a:avLst/>
@@ -5709,7 +5714,7 @@
                 </a:buClr>
               </a:pPr>
               <a:r>
-                <a:rPr lang="en" sz="1200" kern="0">
+                <a:rPr lang="en" sz="1200" kern="0" dirty="0">
                   <a:solidFill>
                     <a:srgbClr val="434343"/>
                   </a:solidFill>
@@ -5718,9 +5723,9 @@
                   <a:cs typeface="Roboto"/>
                   <a:sym typeface="Roboto"/>
                 </a:rPr>
-                <a:t>Jupiter is a gas giant and the biggest planet of them all</a:t>
+                <a:t>Linear modeling technique of a scalar outcome variable with one or more exploratory variables</a:t>
               </a:r>
-              <a:endParaRPr sz="1200" kern="0">
+              <a:endParaRPr sz="1200" kern="0" dirty="0">
                 <a:solidFill>
                   <a:srgbClr val="434343"/>
                 </a:solidFill>

</xml_diff>